<commit_message>
Updates presentation and config files
</commit_message>
<xml_diff>
--- a/Presentation/Project 3 Group 2 powerpoint.pptx
+++ b/Presentation/Project 3 Group 2 powerpoint.pptx
@@ -200,7 +200,7 @@
           <a:p>
             <a:fld id="{C0EBD29C-02E0-C740-983E-2E3105172B52}" type="datetimeFigureOut">
               <a:rPr lang="en-US" smtClean="0"/>
-              <a:t>4/16/24</a:t>
+              <a:t>4/17/24</a:t>
             </a:fld>
             <a:endParaRPr lang="en-US"/>
           </a:p>
@@ -767,7 +767,7 @@
           <a:p>
             <a:fld id="{48602B3E-AF8E-41D9-B64F-30CA86ABA96C}" type="datetimeFigureOut">
               <a:rPr lang="en-AU" smtClean="0"/>
-              <a:t>16/4/2024</a:t>
+              <a:t>17/4/2024</a:t>
             </a:fld>
             <a:endParaRPr lang="en-AU"/>
           </a:p>
@@ -937,7 +937,7 @@
           <a:p>
             <a:fld id="{48602B3E-AF8E-41D9-B64F-30CA86ABA96C}" type="datetimeFigureOut">
               <a:rPr lang="en-AU" smtClean="0"/>
-              <a:t>16/4/2024</a:t>
+              <a:t>17/4/2024</a:t>
             </a:fld>
             <a:endParaRPr lang="en-AU"/>
           </a:p>
@@ -1117,7 +1117,7 @@
           <a:p>
             <a:fld id="{48602B3E-AF8E-41D9-B64F-30CA86ABA96C}" type="datetimeFigureOut">
               <a:rPr lang="en-AU" smtClean="0"/>
-              <a:t>16/4/2024</a:t>
+              <a:t>17/4/2024</a:t>
             </a:fld>
             <a:endParaRPr lang="en-AU"/>
           </a:p>
@@ -1287,7 +1287,7 @@
           <a:p>
             <a:fld id="{48602B3E-AF8E-41D9-B64F-30CA86ABA96C}" type="datetimeFigureOut">
               <a:rPr lang="en-AU" smtClean="0"/>
-              <a:t>16/4/2024</a:t>
+              <a:t>17/4/2024</a:t>
             </a:fld>
             <a:endParaRPr lang="en-AU"/>
           </a:p>
@@ -1533,7 +1533,7 @@
           <a:p>
             <a:fld id="{48602B3E-AF8E-41D9-B64F-30CA86ABA96C}" type="datetimeFigureOut">
               <a:rPr lang="en-AU" smtClean="0"/>
-              <a:t>16/4/2024</a:t>
+              <a:t>17/4/2024</a:t>
             </a:fld>
             <a:endParaRPr lang="en-AU"/>
           </a:p>
@@ -1765,7 +1765,7 @@
           <a:p>
             <a:fld id="{48602B3E-AF8E-41D9-B64F-30CA86ABA96C}" type="datetimeFigureOut">
               <a:rPr lang="en-AU" smtClean="0"/>
-              <a:t>16/4/2024</a:t>
+              <a:t>17/4/2024</a:t>
             </a:fld>
             <a:endParaRPr lang="en-AU"/>
           </a:p>
@@ -2132,7 +2132,7 @@
           <a:p>
             <a:fld id="{48602B3E-AF8E-41D9-B64F-30CA86ABA96C}" type="datetimeFigureOut">
               <a:rPr lang="en-AU" smtClean="0"/>
-              <a:t>16/4/2024</a:t>
+              <a:t>17/4/2024</a:t>
             </a:fld>
             <a:endParaRPr lang="en-AU"/>
           </a:p>
@@ -2250,7 +2250,7 @@
           <a:p>
             <a:fld id="{48602B3E-AF8E-41D9-B64F-30CA86ABA96C}" type="datetimeFigureOut">
               <a:rPr lang="en-AU" smtClean="0"/>
-              <a:t>16/4/2024</a:t>
+              <a:t>17/4/2024</a:t>
             </a:fld>
             <a:endParaRPr lang="en-AU"/>
           </a:p>
@@ -2345,7 +2345,7 @@
           <a:p>
             <a:fld id="{48602B3E-AF8E-41D9-B64F-30CA86ABA96C}" type="datetimeFigureOut">
               <a:rPr lang="en-AU" smtClean="0"/>
-              <a:t>16/4/2024</a:t>
+              <a:t>17/4/2024</a:t>
             </a:fld>
             <a:endParaRPr lang="en-AU"/>
           </a:p>
@@ -2622,7 +2622,7 @@
           <a:p>
             <a:fld id="{48602B3E-AF8E-41D9-B64F-30CA86ABA96C}" type="datetimeFigureOut">
               <a:rPr lang="en-AU" smtClean="0"/>
-              <a:t>16/4/2024</a:t>
+              <a:t>17/4/2024</a:t>
             </a:fld>
             <a:endParaRPr lang="en-AU"/>
           </a:p>
@@ -2879,7 +2879,7 @@
           <a:p>
             <a:fld id="{48602B3E-AF8E-41D9-B64F-30CA86ABA96C}" type="datetimeFigureOut">
               <a:rPr lang="en-AU" smtClean="0"/>
-              <a:t>16/4/2024</a:t>
+              <a:t>17/4/2024</a:t>
             </a:fld>
             <a:endParaRPr lang="en-AU"/>
           </a:p>
@@ -3092,7 +3092,7 @@
           <a:p>
             <a:fld id="{48602B3E-AF8E-41D9-B64F-30CA86ABA96C}" type="datetimeFigureOut">
               <a:rPr lang="en-AU" smtClean="0"/>
-              <a:t>16/4/2024</a:t>
+              <a:t>17/4/2024</a:t>
             </a:fld>
             <a:endParaRPr lang="en-AU"/>
           </a:p>
@@ -3564,49 +3564,7 @@
                 <a:latin typeface="FUTURA MEDIUM" panose="020B0602020204020303" pitchFamily="34" charset="-79"/>
                 <a:cs typeface="FUTURA MEDIUM" panose="020B0602020204020303" pitchFamily="34" charset="-79"/>
               </a:rPr>
-              <a:t>Washington DC Street Light Visualisation and Analysis</a:t>
-            </a:r>
-          </a:p>
-        </p:txBody>
-      </p:sp>
-      <p:sp>
-        <p:nvSpPr>
-          <p:cNvPr id="3" name="Subtitle 2">
-            <a:extLst>
-              <a:ext uri="{FF2B5EF4-FFF2-40B4-BE49-F238E27FC236}">
-                <a16:creationId xmlns:a16="http://schemas.microsoft.com/office/drawing/2014/main" id="{DFD1C459-6EB9-880D-0F7C-74703B7CA5C0}"/>
-              </a:ext>
-            </a:extLst>
-          </p:cNvPr>
-          <p:cNvSpPr>
-            <a:spLocks noGrp="1"/>
-          </p:cNvSpPr>
-          <p:nvPr>
-            <p:ph type="subTitle" idx="1"/>
-          </p:nvPr>
-        </p:nvSpPr>
-        <p:spPr>
-          <a:xfrm>
-            <a:off x="5242249" y="2891118"/>
-            <a:ext cx="6279502" cy="625249"/>
-          </a:xfrm>
-        </p:spPr>
-        <p:txBody>
-          <a:bodyPr>
-            <a:normAutofit/>
-          </a:bodyPr>
-          <a:lstStyle/>
-          <a:p>
-            <a:r>
-              <a:rPr lang="en-AU" sz="2000" dirty="0">
-                <a:solidFill>
-                  <a:schemeClr val="bg1"/>
-                </a:solidFill>
-                <a:latin typeface="Verdana" panose="020B0604030504040204" pitchFamily="34" charset="0"/>
-                <a:ea typeface="Verdana" panose="020B0604030504040204" pitchFamily="34" charset="0"/>
-                <a:cs typeface="Verdana" panose="020B0604030504040204" pitchFamily="34" charset="0"/>
-              </a:rPr>
-              <a:t>Data Visualisation Track</a:t>
+              <a:t>Washington DC Street Lights Visualisation and Analysis</a:t>
             </a:r>
           </a:p>
         </p:txBody>

</xml_diff>